<commit_message>
post presentation debug outputs and user interface
</commit_message>
<xml_diff>
--- a/Documentation/AutoTest DevsPresentation.pptx
+++ b/Documentation/AutoTest DevsPresentation.pptx
@@ -4244,11 +4244,7 @@
             </a:r>
             <a:r>
               <a:rPr lang="en-US" dirty="0" smtClean="0"/>
-              <a:t> for </a:t>
-            </a:r>
-            <a:r>
-              <a:rPr lang="en-US" smtClean="0"/>
-              <a:t>Agile story</a:t>
+              <a:t> for Agile story</a:t>
             </a:r>
             <a:endParaRPr lang="en-US" dirty="0"/>
           </a:p>

</xml_diff>